<commit_message>
Added in updated UML, .metastuph
</commit_message>
<xml_diff>
--- a/Presentation for class.pptx
+++ b/Presentation for class.pptx
@@ -3255,28 +3255,36 @@
       </p:sp>
       <p:pic>
         <p:nvPicPr>
-          <p:cNvPr id="6" name="Picture 5" descr="Screen Shot 2013-04-29 at 5.29.15 PM.png"/>
+          <p:cNvPr id="3" name="Picture 2" descr="Screen Shot 2013-04-29 at 9.36.04 PM.png"/>
           <p:cNvPicPr>
             <a:picLocks noChangeAspect="1"/>
           </p:cNvPicPr>
           <p:nvPr/>
         </p:nvPicPr>
-        <p:blipFill>
+        <p:blipFill rotWithShape="1">
           <a:blip r:embed="rId2">
             <a:extLst>
+              <a:ext uri="{BEBA8EAE-BF5A-486C-A8C5-ECC9F3942E4B}">
+                <a14:imgProps xmlns:a14="http://schemas.microsoft.com/office/drawing/2010/main">
+                  <a14:imgLayer r:embed="rId3">
+                    <a14:imgEffect>
+                      <a14:sharpenSoften amount="50000"/>
+                    </a14:imgEffect>
+                  </a14:imgLayer>
+                </a14:imgProps>
+              </a:ext>
               <a:ext uri="{28A0092B-C50C-407E-A947-70E740481C1C}">
                 <a14:useLocalDpi xmlns:a14="http://schemas.microsoft.com/office/drawing/2010/main" val="0"/>
               </a:ext>
             </a:extLst>
           </a:blip>
-          <a:stretch>
-            <a:fillRect/>
-          </a:stretch>
+          <a:srcRect l="9236" r="6731"/>
+          <a:stretch/>
         </p:blipFill>
         <p:spPr>
           <a:xfrm>
-            <a:off x="923678" y="1417638"/>
-            <a:ext cx="7174999" cy="4570225"/>
+            <a:off x="1055632" y="1647004"/>
+            <a:ext cx="6795632" cy="4610309"/>
           </a:xfrm>
           <a:prstGeom prst="rect">
             <a:avLst/>
@@ -3363,7 +3371,9 @@
         </p:nvSpPr>
         <p:spPr/>
         <p:txBody>
-          <a:bodyPr/>
+          <a:bodyPr>
+            <a:normAutofit lnSpcReduction="10000"/>
+          </a:bodyPr>
           <a:lstStyle/>
           <a:p>
             <a:r>
@@ -3392,18 +3402,44 @@
                   <a:srgbClr val="EEECE1"/>
                 </a:solidFill>
               </a:rPr>
-              <a:t>Importance of using tests to test functionality</a:t>
-            </a:r>
-          </a:p>
-          <a:p>
+              <a:t>Importance of using tests to </a:t>
+            </a:r>
             <a:r>
               <a:rPr lang="en-US" dirty="0" smtClean="0">
                 <a:solidFill>
                   <a:srgbClr val="EEECE1"/>
                 </a:solidFill>
               </a:rPr>
-              <a:t>Importance of breaking up functionality and simplifying functions and classes</a:t>
-            </a:r>
+              <a:t>ensure correct functionality</a:t>
+            </a:r>
+            <a:endParaRPr lang="en-US" dirty="0" smtClean="0">
+              <a:solidFill>
+                <a:srgbClr val="EEECE1"/>
+              </a:solidFill>
+            </a:endParaRPr>
+          </a:p>
+          <a:p>
+            <a:r>
+              <a:rPr lang="en-US" dirty="0" smtClean="0">
+                <a:solidFill>
+                  <a:srgbClr val="EEECE1"/>
+                </a:solidFill>
+              </a:rPr>
+              <a:t>Importance of breaking up functionality and simplifying functions and </a:t>
+            </a:r>
+            <a:r>
+              <a:rPr lang="en-US" dirty="0" smtClean="0">
+                <a:solidFill>
+                  <a:srgbClr val="EEECE1"/>
+                </a:solidFill>
+              </a:rPr>
+              <a:t>classes as much as possible</a:t>
+            </a:r>
+            <a:endParaRPr lang="en-US" dirty="0" smtClean="0">
+              <a:solidFill>
+                <a:srgbClr val="EEECE1"/>
+              </a:solidFill>
+            </a:endParaRPr>
           </a:p>
           <a:p>
             <a:r>
@@ -3430,6 +3466,13 @@
   <p:clrMapOvr>
     <a:masterClrMapping/>
   </p:clrMapOvr>
+  <p:timing>
+    <p:tnLst>
+      <p:par>
+        <p:cTn xmlns:p14="http://schemas.microsoft.com/office/powerpoint/2010/main" id="1" dur="indefinite" restart="never" nodeType="tmRoot"/>
+      </p:par>
+    </p:tnLst>
+  </p:timing>
 </p:sld>
 </file>
 

</xml_diff>